<commit_message>
announce and header page
1.announce page build
2.change logo
</commit_message>
<xml_diff>
--- a/images/_makingIMG.pptx
+++ b/images/_makingIMG.pptx
@@ -288,7 +288,7 @@
           <a:p>
             <a:fld id="{D385F7C1-84E1-41C1-9FDC-9163D8A4981F}" type="datetimeFigureOut">
               <a:rPr lang="zh-TW" altLang="en-US" smtClean="0"/>
-              <a:t>2021/6/13</a:t>
+              <a:t>2021/6/14</a:t>
             </a:fld>
             <a:endParaRPr lang="zh-TW" altLang="en-US"/>
           </a:p>
@@ -458,7 +458,7 @@
           <a:p>
             <a:fld id="{D385F7C1-84E1-41C1-9FDC-9163D8A4981F}" type="datetimeFigureOut">
               <a:rPr lang="zh-TW" altLang="en-US" smtClean="0"/>
-              <a:t>2021/6/13</a:t>
+              <a:t>2021/6/14</a:t>
             </a:fld>
             <a:endParaRPr lang="zh-TW" altLang="en-US"/>
           </a:p>
@@ -638,7 +638,7 @@
           <a:p>
             <a:fld id="{D385F7C1-84E1-41C1-9FDC-9163D8A4981F}" type="datetimeFigureOut">
               <a:rPr lang="zh-TW" altLang="en-US" smtClean="0"/>
-              <a:t>2021/6/13</a:t>
+              <a:t>2021/6/14</a:t>
             </a:fld>
             <a:endParaRPr lang="zh-TW" altLang="en-US"/>
           </a:p>
@@ -808,7 +808,7 @@
           <a:p>
             <a:fld id="{D385F7C1-84E1-41C1-9FDC-9163D8A4981F}" type="datetimeFigureOut">
               <a:rPr lang="zh-TW" altLang="en-US" smtClean="0"/>
-              <a:t>2021/6/13</a:t>
+              <a:t>2021/6/14</a:t>
             </a:fld>
             <a:endParaRPr lang="zh-TW" altLang="en-US"/>
           </a:p>
@@ -1054,7 +1054,7 @@
           <a:p>
             <a:fld id="{D385F7C1-84E1-41C1-9FDC-9163D8A4981F}" type="datetimeFigureOut">
               <a:rPr lang="zh-TW" altLang="en-US" smtClean="0"/>
-              <a:t>2021/6/13</a:t>
+              <a:t>2021/6/14</a:t>
             </a:fld>
             <a:endParaRPr lang="zh-TW" altLang="en-US"/>
           </a:p>
@@ -1342,7 +1342,7 @@
           <a:p>
             <a:fld id="{D385F7C1-84E1-41C1-9FDC-9163D8A4981F}" type="datetimeFigureOut">
               <a:rPr lang="zh-TW" altLang="en-US" smtClean="0"/>
-              <a:t>2021/6/13</a:t>
+              <a:t>2021/6/14</a:t>
             </a:fld>
             <a:endParaRPr lang="zh-TW" altLang="en-US"/>
           </a:p>
@@ -1764,7 +1764,7 @@
           <a:p>
             <a:fld id="{D385F7C1-84E1-41C1-9FDC-9163D8A4981F}" type="datetimeFigureOut">
               <a:rPr lang="zh-TW" altLang="en-US" smtClean="0"/>
-              <a:t>2021/6/13</a:t>
+              <a:t>2021/6/14</a:t>
             </a:fld>
             <a:endParaRPr lang="zh-TW" altLang="en-US"/>
           </a:p>
@@ -1882,7 +1882,7 @@
           <a:p>
             <a:fld id="{D385F7C1-84E1-41C1-9FDC-9163D8A4981F}" type="datetimeFigureOut">
               <a:rPr lang="zh-TW" altLang="en-US" smtClean="0"/>
-              <a:t>2021/6/13</a:t>
+              <a:t>2021/6/14</a:t>
             </a:fld>
             <a:endParaRPr lang="zh-TW" altLang="en-US"/>
           </a:p>
@@ -1977,7 +1977,7 @@
           <a:p>
             <a:fld id="{D385F7C1-84E1-41C1-9FDC-9163D8A4981F}" type="datetimeFigureOut">
               <a:rPr lang="zh-TW" altLang="en-US" smtClean="0"/>
-              <a:t>2021/6/13</a:t>
+              <a:t>2021/6/14</a:t>
             </a:fld>
             <a:endParaRPr lang="zh-TW" altLang="en-US"/>
           </a:p>
@@ -2254,7 +2254,7 @@
           <a:p>
             <a:fld id="{D385F7C1-84E1-41C1-9FDC-9163D8A4981F}" type="datetimeFigureOut">
               <a:rPr lang="zh-TW" altLang="en-US" smtClean="0"/>
-              <a:t>2021/6/13</a:t>
+              <a:t>2021/6/14</a:t>
             </a:fld>
             <a:endParaRPr lang="zh-TW" altLang="en-US"/>
           </a:p>
@@ -2507,7 +2507,7 @@
           <a:p>
             <a:fld id="{D385F7C1-84E1-41C1-9FDC-9163D8A4981F}" type="datetimeFigureOut">
               <a:rPr lang="zh-TW" altLang="en-US" smtClean="0"/>
-              <a:t>2021/6/13</a:t>
+              <a:t>2021/6/14</a:t>
             </a:fld>
             <a:endParaRPr lang="zh-TW" altLang="en-US"/>
           </a:p>
@@ -2720,7 +2720,7 @@
           <a:p>
             <a:fld id="{D385F7C1-84E1-41C1-9FDC-9163D8A4981F}" type="datetimeFigureOut">
               <a:rPr lang="zh-TW" altLang="en-US" smtClean="0"/>
-              <a:t>2021/6/13</a:t>
+              <a:t>2021/6/14</a:t>
             </a:fld>
             <a:endParaRPr lang="zh-TW" altLang="en-US"/>
           </a:p>
@@ -6309,6 +6309,41 @@
           </p:txBody>
         </p:sp>
       </p:grpSp>
+      <p:pic>
+        <p:nvPicPr>
+          <p:cNvPr id="3" name="Picture 2" descr="C:\xampp\htdocs\Website_269\images\LOGO_BAR.png"/>
+          <p:cNvPicPr>
+            <a:picLocks noChangeAspect="1" noChangeArrowheads="1"/>
+          </p:cNvPicPr>
+          <p:nvPr/>
+        </p:nvPicPr>
+        <p:blipFill rotWithShape="1">
+          <a:blip r:embed="rId4">
+            <a:extLst>
+              <a:ext uri="{28A0092B-C50C-407E-A947-70E740481C1C}">
+                <a14:useLocalDpi xmlns:a14="http://schemas.microsoft.com/office/drawing/2010/main" val="0"/>
+              </a:ext>
+            </a:extLst>
+          </a:blip>
+          <a:srcRect l="-3273" t="14161" r="1" b="27294"/>
+          <a:stretch/>
+        </p:blipFill>
+        <p:spPr bwMode="auto">
+          <a:xfrm>
+            <a:off x="698500" y="-2552695"/>
+            <a:ext cx="11520000" cy="1635582"/>
+          </a:xfrm>
+          <a:prstGeom prst="rect">
+            <a:avLst/>
+          </a:prstGeom>
+          <a:solidFill>
+            <a:schemeClr val="accent3">
+              <a:lumMod val="20000"/>
+              <a:lumOff val="80000"/>
+            </a:schemeClr>
+          </a:solidFill>
+        </p:spPr>
+      </p:pic>
     </p:spTree>
     <p:extLst>
       <p:ext uri="{BB962C8B-B14F-4D97-AF65-F5344CB8AC3E}">

</xml_diff>